<commit_message>
reflowing research life cycle / planing
</commit_message>
<xml_diff>
--- a/files/Data-life-cyle-graphs.pptx
+++ b/files/Data-life-cyle-graphs.pptx
@@ -5,13 +5,14 @@
     <p:sldMasterId id="2147483648" r:id="rId1"/>
   </p:sldMasterIdLst>
   <p:notesMasterIdLst>
-    <p:notesMasterId r:id="rId6"/>
+    <p:notesMasterId r:id="rId7"/>
   </p:notesMasterIdLst>
   <p:sldIdLst>
     <p:sldId id="259" r:id="rId2"/>
     <p:sldId id="262" r:id="rId3"/>
     <p:sldId id="261" r:id="rId4"/>
     <p:sldId id="263" r:id="rId5"/>
+    <p:sldId id="264" r:id="rId6"/>
   </p:sldIdLst>
   <p:sldSz cx="12192000" cy="6858000"/>
   <p:notesSz cx="6858000" cy="9144000"/>
@@ -200,7 +201,7 @@
           <a:p>
             <a:fld id="{8B814E53-D361-4273-91AA-1C2BE9AEF585}" type="datetimeFigureOut">
               <a:rPr lang="en-GB" smtClean="0"/>
-              <a:t>26/05/2021</a:t>
+              <a:t>27/05/2021</a:t>
             </a:fld>
             <a:endParaRPr lang="en-GB"/>
           </a:p>
@@ -744,6 +745,98 @@
 </p:notes>
 </file>
 
+<file path=ppt/notesSlides/notesSlide4.xml><?xml version="1.0" encoding="utf-8"?>
+<p:notes xmlns:a="http://schemas.openxmlformats.org/drawingml/2006/main" xmlns:r="http://schemas.openxmlformats.org/officeDocument/2006/relationships" xmlns:p="http://schemas.openxmlformats.org/presentationml/2006/main">
+  <p:cSld>
+    <p:spTree>
+      <p:nvGrpSpPr>
+        <p:cNvPr id="1" name=""/>
+        <p:cNvGrpSpPr/>
+        <p:nvPr/>
+      </p:nvGrpSpPr>
+      <p:grpSpPr>
+        <a:xfrm>
+          <a:off x="0" y="0"/>
+          <a:ext cx="0" cy="0"/>
+          <a:chOff x="0" y="0"/>
+          <a:chExt cx="0" cy="0"/>
+        </a:xfrm>
+      </p:grpSpPr>
+      <p:sp>
+        <p:nvSpPr>
+          <p:cNvPr id="2" name="Slide Image Placeholder 1"/>
+          <p:cNvSpPr>
+            <a:spLocks noGrp="1" noRot="1" noChangeAspect="1"/>
+          </p:cNvSpPr>
+          <p:nvPr>
+            <p:ph type="sldImg"/>
+          </p:nvPr>
+        </p:nvSpPr>
+        <p:spPr/>
+      </p:sp>
+      <p:sp>
+        <p:nvSpPr>
+          <p:cNvPr id="3" name="Notes Placeholder 2"/>
+          <p:cNvSpPr>
+            <a:spLocks noGrp="1"/>
+          </p:cNvSpPr>
+          <p:nvPr>
+            <p:ph type="body" idx="1"/>
+          </p:nvPr>
+        </p:nvSpPr>
+        <p:spPr/>
+        <p:txBody>
+          <a:bodyPr/>
+          <a:lstStyle/>
+          <a:p>
+            <a:r>
+              <a:rPr lang="en-GB" dirty="0"/>
+              <a:t>Acquire</a:t>
+            </a:r>
+            <a:r>
+              <a:rPr lang="en-GB" baseline="0" dirty="0"/>
+              <a:t> description at earlier stages, split over the stages</a:t>
+            </a:r>
+            <a:endParaRPr lang="en-GB" dirty="0"/>
+          </a:p>
+        </p:txBody>
+      </p:sp>
+      <p:sp>
+        <p:nvSpPr>
+          <p:cNvPr id="4" name="Slide Number Placeholder 3"/>
+          <p:cNvSpPr>
+            <a:spLocks noGrp="1"/>
+          </p:cNvSpPr>
+          <p:nvPr>
+            <p:ph type="sldNum" sz="quarter" idx="10"/>
+          </p:nvPr>
+        </p:nvSpPr>
+        <p:spPr/>
+        <p:txBody>
+          <a:bodyPr/>
+          <a:lstStyle/>
+          <a:p>
+            <a:fld id="{239EC2EB-146A-487B-BC60-C531542ADEB7}" type="slidenum">
+              <a:rPr lang="en-GB" smtClean="0"/>
+              <a:t>5</a:t>
+            </a:fld>
+            <a:endParaRPr lang="en-GB"/>
+          </a:p>
+        </p:txBody>
+      </p:sp>
+    </p:spTree>
+    <p:extLst>
+      <p:ext uri="{BB962C8B-B14F-4D97-AF65-F5344CB8AC3E}">
+        <p14:creationId xmlns:p14="http://schemas.microsoft.com/office/powerpoint/2010/main" val="1892581221"/>
+      </p:ext>
+    </p:extLst>
+  </p:cSld>
+  <p:clrMapOvr>
+    <a:masterClrMapping/>
+  </p:clrMapOvr>
+</p:notes>
+</file>
+
 <file path=ppt/slideLayouts/slideLayout1.xml><?xml version="1.0" encoding="utf-8"?>
 <p:sldLayout xmlns:a="http://schemas.openxmlformats.org/drawingml/2006/main" xmlns:r="http://schemas.openxmlformats.org/officeDocument/2006/relationships" xmlns:p="http://schemas.openxmlformats.org/presentationml/2006/main" type="title" preserve="1">
   <p:cSld name="Title Slide">
@@ -875,7 +968,7 @@
           <a:p>
             <a:fld id="{15537973-4993-4EFA-9DD6-AFDABAA7DB8F}" type="datetimeFigureOut">
               <a:rPr lang="en-GB" smtClean="0"/>
-              <a:t>26/05/2021</a:t>
+              <a:t>27/05/2021</a:t>
             </a:fld>
             <a:endParaRPr lang="en-GB"/>
           </a:p>
@@ -1045,7 +1138,7 @@
           <a:p>
             <a:fld id="{15537973-4993-4EFA-9DD6-AFDABAA7DB8F}" type="datetimeFigureOut">
               <a:rPr lang="en-GB" smtClean="0"/>
-              <a:t>26/05/2021</a:t>
+              <a:t>27/05/2021</a:t>
             </a:fld>
             <a:endParaRPr lang="en-GB"/>
           </a:p>
@@ -1225,7 +1318,7 @@
           <a:p>
             <a:fld id="{15537973-4993-4EFA-9DD6-AFDABAA7DB8F}" type="datetimeFigureOut">
               <a:rPr lang="en-GB" smtClean="0"/>
-              <a:t>26/05/2021</a:t>
+              <a:t>27/05/2021</a:t>
             </a:fld>
             <a:endParaRPr lang="en-GB"/>
           </a:p>
@@ -1395,7 +1488,7 @@
           <a:p>
             <a:fld id="{15537973-4993-4EFA-9DD6-AFDABAA7DB8F}" type="datetimeFigureOut">
               <a:rPr lang="en-GB" smtClean="0"/>
-              <a:t>26/05/2021</a:t>
+              <a:t>27/05/2021</a:t>
             </a:fld>
             <a:endParaRPr lang="en-GB"/>
           </a:p>
@@ -1641,7 +1734,7 @@
           <a:p>
             <a:fld id="{15537973-4993-4EFA-9DD6-AFDABAA7DB8F}" type="datetimeFigureOut">
               <a:rPr lang="en-GB" smtClean="0"/>
-              <a:t>26/05/2021</a:t>
+              <a:t>27/05/2021</a:t>
             </a:fld>
             <a:endParaRPr lang="en-GB"/>
           </a:p>
@@ -1873,7 +1966,7 @@
           <a:p>
             <a:fld id="{15537973-4993-4EFA-9DD6-AFDABAA7DB8F}" type="datetimeFigureOut">
               <a:rPr lang="en-GB" smtClean="0"/>
-              <a:t>26/05/2021</a:t>
+              <a:t>27/05/2021</a:t>
             </a:fld>
             <a:endParaRPr lang="en-GB"/>
           </a:p>
@@ -2240,7 +2333,7 @@
           <a:p>
             <a:fld id="{15537973-4993-4EFA-9DD6-AFDABAA7DB8F}" type="datetimeFigureOut">
               <a:rPr lang="en-GB" smtClean="0"/>
-              <a:t>26/05/2021</a:t>
+              <a:t>27/05/2021</a:t>
             </a:fld>
             <a:endParaRPr lang="en-GB"/>
           </a:p>
@@ -2358,7 +2451,7 @@
           <a:p>
             <a:fld id="{15537973-4993-4EFA-9DD6-AFDABAA7DB8F}" type="datetimeFigureOut">
               <a:rPr lang="en-GB" smtClean="0"/>
-              <a:t>26/05/2021</a:t>
+              <a:t>27/05/2021</a:t>
             </a:fld>
             <a:endParaRPr lang="en-GB"/>
           </a:p>
@@ -2453,7 +2546,7 @@
           <a:p>
             <a:fld id="{15537973-4993-4EFA-9DD6-AFDABAA7DB8F}" type="datetimeFigureOut">
               <a:rPr lang="en-GB" smtClean="0"/>
-              <a:t>26/05/2021</a:t>
+              <a:t>27/05/2021</a:t>
             </a:fld>
             <a:endParaRPr lang="en-GB"/>
           </a:p>
@@ -2730,7 +2823,7 @@
           <a:p>
             <a:fld id="{15537973-4993-4EFA-9DD6-AFDABAA7DB8F}" type="datetimeFigureOut">
               <a:rPr lang="en-GB" smtClean="0"/>
-              <a:t>26/05/2021</a:t>
+              <a:t>27/05/2021</a:t>
             </a:fld>
             <a:endParaRPr lang="en-GB"/>
           </a:p>
@@ -2983,7 +3076,7 @@
           <a:p>
             <a:fld id="{15537973-4993-4EFA-9DD6-AFDABAA7DB8F}" type="datetimeFigureOut">
               <a:rPr lang="en-GB" smtClean="0"/>
-              <a:t>26/05/2021</a:t>
+              <a:t>27/05/2021</a:t>
             </a:fld>
             <a:endParaRPr lang="en-GB"/>
           </a:p>
@@ -3196,7 +3289,7 @@
           <a:p>
             <a:fld id="{15537973-4993-4EFA-9DD6-AFDABAA7DB8F}" type="datetimeFigureOut">
               <a:rPr lang="en-GB" smtClean="0"/>
-              <a:t>26/05/2021</a:t>
+              <a:t>27/05/2021</a:t>
             </a:fld>
             <a:endParaRPr lang="en-GB"/>
           </a:p>
@@ -4836,7 +4929,7 @@
             <a:effectLst/>
             <a:extLst>
               <a:ext uri="{AF507438-7753-43e0-B8FC-AC1667EBCBE1}">
-                <a14:hiddenEffects xmlns:a14="http://schemas.microsoft.com/office/drawing/2010/main" xmlns="">
+                <a14:hiddenEffects xmlns="" xmlns:a14="http://schemas.microsoft.com/office/drawing/2010/main">
                   <a:effectLst>
                     <a:outerShdw dist="35921" dir="2700000" algn="ctr" rotWithShape="0">
                       <a:schemeClr val="bg2"/>
@@ -4898,7 +4991,7 @@
             <a:effectLst/>
             <a:extLst>
               <a:ext uri="{AF507438-7753-43e0-B8FC-AC1667EBCBE1}">
-                <a14:hiddenEffects xmlns:a14="http://schemas.microsoft.com/office/drawing/2010/main" xmlns="">
+                <a14:hiddenEffects xmlns="" xmlns:a14="http://schemas.microsoft.com/office/drawing/2010/main">
                   <a:effectLst>
                     <a:outerShdw dist="35921" dir="2700000" algn="ctr" rotWithShape="0">
                       <a:schemeClr val="bg2"/>
@@ -4960,7 +5053,7 @@
             <a:effectLst/>
             <a:extLst>
               <a:ext uri="{AF507438-7753-43e0-B8FC-AC1667EBCBE1}">
-                <a14:hiddenEffects xmlns:a14="http://schemas.microsoft.com/office/drawing/2010/main" xmlns="">
+                <a14:hiddenEffects xmlns="" xmlns:a14="http://schemas.microsoft.com/office/drawing/2010/main">
                   <a:effectLst>
                     <a:outerShdw dist="35921" dir="2700000" algn="ctr" rotWithShape="0">
                       <a:schemeClr val="bg2"/>
@@ -5051,15 +5144,7 @@
           <a:p>
             <a:r>
               <a:rPr lang="pl-PL" sz="1200" dirty="0" smtClean="0"/>
-              <a:t>work </a:t>
-            </a:r>
-            <a:r>
-              <a:rPr lang="pl-PL" sz="1200" dirty="0" smtClean="0"/>
-              <a:t>necessary to </a:t>
-            </a:r>
-            <a:r>
-              <a:rPr lang="pl-PL" sz="1200" dirty="0" smtClean="0"/>
-              <a:t>make outputs suitable for sharing</a:t>
+              <a:t>work necessary to make outputs suitable for sharing</a:t>
             </a:r>
             <a:endParaRPr lang="en-GB" sz="1200" dirty="0"/>
           </a:p>
@@ -5139,7 +5224,7 @@
           <a:effectLst/>
           <a:extLst>
             <a:ext uri="{AF507438-7753-43e0-B8FC-AC1667EBCBE1}">
-              <a14:hiddenEffects xmlns:a14="http://schemas.microsoft.com/office/drawing/2010/main" xmlns="">
+              <a14:hiddenEffects xmlns="" xmlns:a14="http://schemas.microsoft.com/office/drawing/2010/main">
                 <a:effectLst>
                   <a:outerShdw dist="35921" dir="2700000" algn="ctr" rotWithShape="0">
                     <a:schemeClr val="bg2"/>
@@ -5470,7 +5555,7 @@
             <a:effectLst/>
             <a:extLst>
               <a:ext uri="{AF507438-7753-43e0-B8FC-AC1667EBCBE1}">
-                <a14:hiddenEffects xmlns:a14="http://schemas.microsoft.com/office/drawing/2010/main" xmlns="">
+                <a14:hiddenEffects xmlns="" xmlns:a14="http://schemas.microsoft.com/office/drawing/2010/main">
                   <a:effectLst>
                     <a:outerShdw dist="35921" dir="2700000" algn="ctr" rotWithShape="0">
                       <a:schemeClr val="bg2"/>
@@ -5532,7 +5617,7 @@
             <a:effectLst/>
             <a:extLst>
               <a:ext uri="{AF507438-7753-43e0-B8FC-AC1667EBCBE1}">
-                <a14:hiddenEffects xmlns:a14="http://schemas.microsoft.com/office/drawing/2010/main" xmlns="">
+                <a14:hiddenEffects xmlns="" xmlns:a14="http://schemas.microsoft.com/office/drawing/2010/main">
                   <a:effectLst>
                     <a:outerShdw dist="35921" dir="2700000" algn="ctr" rotWithShape="0">
                       <a:schemeClr val="bg2"/>
@@ -5609,7 +5694,7 @@
             <a:effectLst/>
             <a:extLst>
               <a:ext uri="{AF507438-7753-43e0-B8FC-AC1667EBCBE1}">
-                <a14:hiddenEffects xmlns:a14="http://schemas.microsoft.com/office/drawing/2010/main" xmlns="">
+                <a14:hiddenEffects xmlns="" xmlns:a14="http://schemas.microsoft.com/office/drawing/2010/main">
                   <a:effectLst>
                     <a:outerShdw dist="35921" dir="2700000" algn="ctr" rotWithShape="0">
                       <a:schemeClr val="bg2"/>
@@ -5671,7 +5756,7 @@
             <a:effectLst/>
             <a:extLst>
               <a:ext uri="{AF507438-7753-43e0-B8FC-AC1667EBCBE1}">
-                <a14:hiddenEffects xmlns:a14="http://schemas.microsoft.com/office/drawing/2010/main" xmlns="">
+                <a14:hiddenEffects xmlns="" xmlns:a14="http://schemas.microsoft.com/office/drawing/2010/main">
                   <a:effectLst>
                     <a:outerShdw dist="35921" dir="2700000" algn="ctr" rotWithShape="0">
                       <a:schemeClr val="bg2"/>
@@ -6911,7 +6996,7 @@
           <a:effectLst/>
           <a:extLst>
             <a:ext uri="{AF507438-7753-43e0-B8FC-AC1667EBCBE1}">
-              <a14:hiddenEffects xmlns:a14="http://schemas.microsoft.com/office/drawing/2010/main" xmlns="">
+              <a14:hiddenEffects xmlns="" xmlns:a14="http://schemas.microsoft.com/office/drawing/2010/main">
                 <a:effectLst>
                   <a:outerShdw dist="35921" dir="2700000" algn="ctr" rotWithShape="0">
                     <a:schemeClr val="bg2"/>
@@ -7071,11 +7156,7 @@
             </a:r>
             <a:r>
               <a:rPr lang="pl-PL" sz="1200" dirty="0" smtClean="0"/>
-              <a:t>ork necessary </a:t>
-            </a:r>
-            <a:r>
-              <a:rPr lang="pl-PL" sz="1200" dirty="0" smtClean="0"/>
-              <a:t>to make outputs suitable for sharing</a:t>
+              <a:t>ork necessary to make outputs suitable for sharing</a:t>
             </a:r>
             <a:endParaRPr lang="en-GB" sz="1200" dirty="0"/>
           </a:p>
@@ -7153,15 +7234,7 @@
           <a:p>
             <a:r>
               <a:rPr lang="pl-PL" sz="1200" dirty="0" smtClean="0"/>
-              <a:t>standard </a:t>
-            </a:r>
-            <a:r>
-              <a:rPr lang="pl-PL" sz="1200" dirty="0" smtClean="0"/>
-              <a:t>research </a:t>
-            </a:r>
-            <a:r>
-              <a:rPr lang="pl-PL" sz="1200" dirty="0" smtClean="0"/>
-              <a:t>operations</a:t>
+              <a:t>standard research operations</a:t>
             </a:r>
             <a:endParaRPr lang="en-GB" sz="1200" dirty="0"/>
           </a:p>
@@ -7241,7 +7314,7 @@
           <a:effectLst/>
           <a:extLst>
             <a:ext uri="{AF507438-7753-43e0-B8FC-AC1667EBCBE1}">
-              <a14:hiddenEffects xmlns:a14="http://schemas.microsoft.com/office/drawing/2010/main" xmlns="">
+              <a14:hiddenEffects xmlns="" xmlns:a14="http://schemas.microsoft.com/office/drawing/2010/main">
                 <a:effectLst>
                   <a:outerShdw dist="35921" dir="2700000" algn="ctr" rotWithShape="0">
                     <a:schemeClr val="bg2"/>
@@ -7572,7 +7645,7 @@
             <a:effectLst/>
             <a:extLst>
               <a:ext uri="{AF507438-7753-43e0-B8FC-AC1667EBCBE1}">
-                <a14:hiddenEffects xmlns:a14="http://schemas.microsoft.com/office/drawing/2010/main" xmlns="">
+                <a14:hiddenEffects xmlns="" xmlns:a14="http://schemas.microsoft.com/office/drawing/2010/main">
                   <a:effectLst>
                     <a:outerShdw dist="35921" dir="2700000" algn="ctr" rotWithShape="0">
                       <a:schemeClr val="bg2"/>
@@ -7634,7 +7707,7 @@
             <a:effectLst/>
             <a:extLst>
               <a:ext uri="{AF507438-7753-43e0-B8FC-AC1667EBCBE1}">
-                <a14:hiddenEffects xmlns:a14="http://schemas.microsoft.com/office/drawing/2010/main" xmlns="">
+                <a14:hiddenEffects xmlns="" xmlns:a14="http://schemas.microsoft.com/office/drawing/2010/main">
                   <a:effectLst>
                     <a:outerShdw dist="35921" dir="2700000" algn="ctr" rotWithShape="0">
                       <a:schemeClr val="bg2"/>
@@ -7711,7 +7784,7 @@
             <a:effectLst/>
             <a:extLst>
               <a:ext uri="{AF507438-7753-43e0-B8FC-AC1667EBCBE1}">
-                <a14:hiddenEffects xmlns:a14="http://schemas.microsoft.com/office/drawing/2010/main" xmlns="">
+                <a14:hiddenEffects xmlns="" xmlns:a14="http://schemas.microsoft.com/office/drawing/2010/main">
                   <a:effectLst>
                     <a:outerShdw dist="35921" dir="2700000" algn="ctr" rotWithShape="0">
                       <a:schemeClr val="bg2"/>
@@ -7773,7 +7846,7 @@
             <a:effectLst/>
             <a:extLst>
               <a:ext uri="{AF507438-7753-43e0-B8FC-AC1667EBCBE1}">
-                <a14:hiddenEffects xmlns:a14="http://schemas.microsoft.com/office/drawing/2010/main" xmlns="">
+                <a14:hiddenEffects xmlns="" xmlns:a14="http://schemas.microsoft.com/office/drawing/2010/main">
                   <a:effectLst>
                     <a:outerShdw dist="35921" dir="2700000" algn="ctr" rotWithShape="0">
                       <a:schemeClr val="bg2"/>
@@ -9007,7 +9080,7 @@
           <a:effectLst/>
           <a:extLst>
             <a:ext uri="{AF507438-7753-43e0-B8FC-AC1667EBCBE1}">
-              <a14:hiddenEffects xmlns:a14="http://schemas.microsoft.com/office/drawing/2010/main" xmlns="">
+              <a14:hiddenEffects xmlns="" xmlns:a14="http://schemas.microsoft.com/office/drawing/2010/main">
                 <a:effectLst>
                   <a:outerShdw dist="35921" dir="2700000" algn="ctr" rotWithShape="0">
                     <a:schemeClr val="bg2"/>
@@ -9197,7 +9270,7 @@
             <a:effectLst/>
             <a:extLst>
               <a:ext uri="{AF507438-7753-43e0-B8FC-AC1667EBCBE1}">
-                <a14:hiddenEffects xmlns:a14="http://schemas.microsoft.com/office/drawing/2010/main" xmlns="">
+                <a14:hiddenEffects xmlns="" xmlns:a14="http://schemas.microsoft.com/office/drawing/2010/main">
                   <a:effectLst>
                     <a:outerShdw dist="35921" dir="2700000" algn="ctr" rotWithShape="0">
                       <a:schemeClr val="bg2"/>
@@ -9259,7 +9332,7 @@
             <a:effectLst/>
             <a:extLst>
               <a:ext uri="{AF507438-7753-43e0-B8FC-AC1667EBCBE1}">
-                <a14:hiddenEffects xmlns:a14="http://schemas.microsoft.com/office/drawing/2010/main" xmlns="">
+                <a14:hiddenEffects xmlns="" xmlns:a14="http://schemas.microsoft.com/office/drawing/2010/main">
                   <a:effectLst>
                     <a:outerShdw dist="35921" dir="2700000" algn="ctr" rotWithShape="0">
                       <a:schemeClr val="bg2"/>
@@ -9321,7 +9394,7 @@
             <a:effectLst/>
             <a:extLst>
               <a:ext uri="{AF507438-7753-43e0-B8FC-AC1667EBCBE1}">
-                <a14:hiddenEffects xmlns:a14="http://schemas.microsoft.com/office/drawing/2010/main" xmlns="">
+                <a14:hiddenEffects xmlns="" xmlns:a14="http://schemas.microsoft.com/office/drawing/2010/main">
                   <a:effectLst>
                     <a:outerShdw dist="35921" dir="2700000" algn="ctr" rotWithShape="0">
                       <a:schemeClr val="bg2"/>
@@ -10761,7 +10834,7 @@
             <a:effectLst/>
             <a:extLst>
               <a:ext uri="{AF507438-7753-43e0-B8FC-AC1667EBCBE1}">
-                <a14:hiddenEffects xmlns:a14="http://schemas.microsoft.com/office/drawing/2010/main" xmlns="">
+                <a14:hiddenEffects xmlns="" xmlns:a14="http://schemas.microsoft.com/office/drawing/2010/main">
                   <a:effectLst>
                     <a:outerShdw dist="35921" dir="2700000" algn="ctr" rotWithShape="0">
                       <a:schemeClr val="bg2"/>
@@ -10823,7 +10896,7 @@
             <a:effectLst/>
             <a:extLst>
               <a:ext uri="{AF507438-7753-43e0-B8FC-AC1667EBCBE1}">
-                <a14:hiddenEffects xmlns:a14="http://schemas.microsoft.com/office/drawing/2010/main" xmlns="">
+                <a14:hiddenEffects xmlns="" xmlns:a14="http://schemas.microsoft.com/office/drawing/2010/main">
                   <a:effectLst>
                     <a:outerShdw dist="35921" dir="2700000" algn="ctr" rotWithShape="0">
                       <a:schemeClr val="bg2"/>
@@ -10885,7 +10958,7 @@
             <a:effectLst/>
             <a:extLst>
               <a:ext uri="{AF507438-7753-43e0-B8FC-AC1667EBCBE1}">
-                <a14:hiddenEffects xmlns:a14="http://schemas.microsoft.com/office/drawing/2010/main" xmlns="">
+                <a14:hiddenEffects xmlns="" xmlns:a14="http://schemas.microsoft.com/office/drawing/2010/main">
                   <a:effectLst>
                     <a:outerShdw dist="35921" dir="2700000" algn="ctr" rotWithShape="0">
                       <a:schemeClr val="bg2"/>
@@ -11026,7 +11099,7 @@
           <a:effectLst/>
           <a:extLst>
             <a:ext uri="{AF507438-7753-43e0-B8FC-AC1667EBCBE1}">
-              <a14:hiddenEffects xmlns:a14="http://schemas.microsoft.com/office/drawing/2010/main" xmlns="">
+              <a14:hiddenEffects xmlns="" xmlns:a14="http://schemas.microsoft.com/office/drawing/2010/main">
                 <a:effectLst>
                   <a:outerShdw dist="35921" dir="2700000" algn="ctr" rotWithShape="0">
                     <a:schemeClr val="bg2"/>
@@ -11357,7 +11430,7 @@
             <a:effectLst/>
             <a:extLst>
               <a:ext uri="{AF507438-7753-43e0-B8FC-AC1667EBCBE1}">
-                <a14:hiddenEffects xmlns:a14="http://schemas.microsoft.com/office/drawing/2010/main" xmlns="">
+                <a14:hiddenEffects xmlns="" xmlns:a14="http://schemas.microsoft.com/office/drawing/2010/main">
                   <a:effectLst>
                     <a:outerShdw dist="35921" dir="2700000" algn="ctr" rotWithShape="0">
                       <a:schemeClr val="bg2"/>
@@ -11419,7 +11492,7 @@
             <a:effectLst/>
             <a:extLst>
               <a:ext uri="{AF507438-7753-43e0-B8FC-AC1667EBCBE1}">
-                <a14:hiddenEffects xmlns:a14="http://schemas.microsoft.com/office/drawing/2010/main" xmlns="">
+                <a14:hiddenEffects xmlns="" xmlns:a14="http://schemas.microsoft.com/office/drawing/2010/main">
                   <a:effectLst>
                     <a:outerShdw dist="35921" dir="2700000" algn="ctr" rotWithShape="0">
                       <a:schemeClr val="bg2"/>
@@ -11496,7 +11569,7 @@
             <a:effectLst/>
             <a:extLst>
               <a:ext uri="{AF507438-7753-43e0-B8FC-AC1667EBCBE1}">
-                <a14:hiddenEffects xmlns:a14="http://schemas.microsoft.com/office/drawing/2010/main" xmlns="">
+                <a14:hiddenEffects xmlns="" xmlns:a14="http://schemas.microsoft.com/office/drawing/2010/main">
                   <a:effectLst>
                     <a:outerShdw dist="35921" dir="2700000" algn="ctr" rotWithShape="0">
                       <a:schemeClr val="bg2"/>
@@ -11558,7 +11631,7 @@
             <a:effectLst/>
             <a:extLst>
               <a:ext uri="{AF507438-7753-43e0-B8FC-AC1667EBCBE1}">
-                <a14:hiddenEffects xmlns:a14="http://schemas.microsoft.com/office/drawing/2010/main" xmlns="">
+                <a14:hiddenEffects xmlns="" xmlns:a14="http://schemas.microsoft.com/office/drawing/2010/main">
                   <a:effectLst>
                     <a:outerShdw dist="35921" dir="2700000" algn="ctr" rotWithShape="0">
                       <a:schemeClr val="bg2"/>
@@ -12798,7 +12871,7 @@
           <a:effectLst/>
           <a:extLst>
             <a:ext uri="{AF507438-7753-43e0-B8FC-AC1667EBCBE1}">
-              <a14:hiddenEffects xmlns:a14="http://schemas.microsoft.com/office/drawing/2010/main" xmlns="">
+              <a14:hiddenEffects xmlns="" xmlns:a14="http://schemas.microsoft.com/office/drawing/2010/main">
                 <a:effectLst>
                   <a:outerShdw dist="35921" dir="2700000" algn="ctr" rotWithShape="0">
                     <a:schemeClr val="bg2"/>
@@ -13024,6 +13097,1102 @@
     <p:extLst>
       <p:ext uri="{BB962C8B-B14F-4D97-AF65-F5344CB8AC3E}">
         <p14:creationId xmlns:p14="http://schemas.microsoft.com/office/powerpoint/2010/main" val="1214825043"/>
+      </p:ext>
+    </p:extLst>
+  </p:cSld>
+  <p:clrMapOvr>
+    <a:masterClrMapping/>
+  </p:clrMapOvr>
+</p:sld>
+</file>
+
+<file path=ppt/slides/slide5.xml><?xml version="1.0" encoding="utf-8"?>
+<p:sld xmlns:a="http://schemas.openxmlformats.org/drawingml/2006/main" xmlns:r="http://schemas.openxmlformats.org/officeDocument/2006/relationships" xmlns:p="http://schemas.openxmlformats.org/presentationml/2006/main">
+  <p:cSld>
+    <p:spTree>
+      <p:nvGrpSpPr>
+        <p:cNvPr id="1" name=""/>
+        <p:cNvGrpSpPr/>
+        <p:nvPr/>
+      </p:nvGrpSpPr>
+      <p:grpSpPr>
+        <a:xfrm>
+          <a:off x="0" y="0"/>
+          <a:ext cx="0" cy="0"/>
+          <a:chOff x="0" y="0"/>
+          <a:chExt cx="0" cy="0"/>
+        </a:xfrm>
+      </p:grpSpPr>
+      <p:grpSp>
+        <p:nvGrpSpPr>
+          <p:cNvPr id="23" name="Group 22"/>
+          <p:cNvGrpSpPr/>
+          <p:nvPr/>
+        </p:nvGrpSpPr>
+        <p:grpSpPr>
+          <a:xfrm>
+            <a:off x="5089775" y="517616"/>
+            <a:ext cx="3876021" cy="3915317"/>
+            <a:chOff x="2051720" y="1700808"/>
+            <a:chExt cx="4633544" cy="4680520"/>
+          </a:xfrm>
+        </p:grpSpPr>
+        <p:grpSp>
+          <p:nvGrpSpPr>
+            <p:cNvPr id="24" name="Group 23"/>
+            <p:cNvGrpSpPr/>
+            <p:nvPr/>
+          </p:nvGrpSpPr>
+          <p:grpSpPr>
+            <a:xfrm>
+              <a:off x="2051720" y="1700808"/>
+              <a:ext cx="4633544" cy="4680520"/>
+              <a:chOff x="1979712" y="1916832"/>
+              <a:chExt cx="4633544" cy="4680520"/>
+            </a:xfrm>
+          </p:grpSpPr>
+          <p:sp>
+            <p:nvSpPr>
+              <p:cNvPr id="31" name="Oval 30"/>
+              <p:cNvSpPr/>
+              <p:nvPr/>
+            </p:nvSpPr>
+            <p:spPr>
+              <a:xfrm>
+                <a:off x="2310826" y="2348880"/>
+                <a:ext cx="3942390" cy="3942390"/>
+              </a:xfrm>
+              <a:prstGeom prst="ellipse">
+                <a:avLst/>
+              </a:prstGeom>
+              <a:noFill/>
+              <a:ln w="57150">
+                <a:solidFill>
+                  <a:schemeClr val="accent1">
+                    <a:lumMod val="40000"/>
+                    <a:lumOff val="60000"/>
+                  </a:schemeClr>
+                </a:solidFill>
+              </a:ln>
+            </p:spPr>
+            <p:style>
+              <a:lnRef idx="2">
+                <a:schemeClr val="accent1">
+                  <a:shade val="50000"/>
+                </a:schemeClr>
+              </a:lnRef>
+              <a:fillRef idx="1">
+                <a:schemeClr val="accent1"/>
+              </a:fillRef>
+              <a:effectRef idx="0">
+                <a:schemeClr val="accent1"/>
+              </a:effectRef>
+              <a:fontRef idx="minor">
+                <a:schemeClr val="lt1"/>
+              </a:fontRef>
+            </p:style>
+            <p:txBody>
+              <a:bodyPr rtlCol="0" anchor="ctr"/>
+              <a:lstStyle/>
+              <a:p>
+                <a:pPr algn="ctr"/>
+                <a:endParaRPr lang="en-GB" dirty="0"/>
+              </a:p>
+            </p:txBody>
+          </p:sp>
+          <p:grpSp>
+            <p:nvGrpSpPr>
+              <p:cNvPr id="32" name="Group 31"/>
+              <p:cNvGrpSpPr/>
+              <p:nvPr/>
+            </p:nvGrpSpPr>
+            <p:grpSpPr>
+              <a:xfrm>
+                <a:off x="3563888" y="1916832"/>
+                <a:ext cx="1224136" cy="1224136"/>
+                <a:chOff x="3923928" y="2492896"/>
+                <a:chExt cx="1224136" cy="1224136"/>
+              </a:xfrm>
+            </p:grpSpPr>
+            <p:sp>
+              <p:nvSpPr>
+                <p:cNvPr id="50" name="Oval 49"/>
+                <p:cNvSpPr/>
+                <p:nvPr/>
+              </p:nvSpPr>
+              <p:spPr>
+                <a:xfrm>
+                  <a:off x="3923928" y="2492896"/>
+                  <a:ext cx="1224136" cy="1224136"/>
+                </a:xfrm>
+                <a:prstGeom prst="ellipse">
+                  <a:avLst/>
+                </a:prstGeom>
+                <a:solidFill>
+                  <a:srgbClr val="5B9BD5"/>
+                </a:solidFill>
+              </p:spPr>
+              <p:style>
+                <a:lnRef idx="2">
+                  <a:schemeClr val="accent1">
+                    <a:shade val="50000"/>
+                  </a:schemeClr>
+                </a:lnRef>
+                <a:fillRef idx="1">
+                  <a:schemeClr val="accent1"/>
+                </a:fillRef>
+                <a:effectRef idx="0">
+                  <a:schemeClr val="accent1"/>
+                </a:effectRef>
+                <a:fontRef idx="minor">
+                  <a:schemeClr val="lt1"/>
+                </a:fontRef>
+              </p:style>
+              <p:txBody>
+                <a:bodyPr rtlCol="0" anchor="ctr"/>
+                <a:lstStyle/>
+                <a:p>
+                  <a:pPr algn="ctr"/>
+                  <a:endParaRPr lang="en-GB" sz="1000" dirty="0">
+                    <a:latin typeface="Arial" panose="020B0604020202020204" pitchFamily="34" charset="0"/>
+                    <a:cs typeface="Arial" panose="020B0604020202020204" pitchFamily="34" charset="0"/>
+                  </a:endParaRPr>
+                </a:p>
+              </p:txBody>
+            </p:sp>
+            <p:sp>
+              <p:nvSpPr>
+                <p:cNvPr id="51" name="TextBox 50"/>
+                <p:cNvSpPr txBox="1"/>
+                <p:nvPr/>
+              </p:nvSpPr>
+              <p:spPr>
+                <a:xfrm>
+                  <a:off x="3959932" y="2843354"/>
+                  <a:ext cx="1152128" cy="551892"/>
+                </a:xfrm>
+                <a:prstGeom prst="rect">
+                  <a:avLst/>
+                </a:prstGeom>
+                <a:noFill/>
+              </p:spPr>
+              <p:txBody>
+                <a:bodyPr wrap="square" rtlCol="0">
+                  <a:spAutoFit/>
+                </a:bodyPr>
+                <a:lstStyle/>
+                <a:p>
+                  <a:pPr algn="ctr"/>
+                  <a:r>
+                    <a:rPr lang="pl-PL" sz="1200" dirty="0">
+                      <a:solidFill>
+                        <a:schemeClr val="bg1"/>
+                      </a:solidFill>
+                      <a:latin typeface="Arial" panose="020B0604020202020204" pitchFamily="34" charset="0"/>
+                      <a:cs typeface="Arial" panose="020B0604020202020204" pitchFamily="34" charset="0"/>
+                    </a:rPr>
+                    <a:t>CREATING DATA</a:t>
+                  </a:r>
+                  <a:endParaRPr lang="en-GB" sz="1200" dirty="0">
+                    <a:solidFill>
+                      <a:schemeClr val="bg1"/>
+                    </a:solidFill>
+                    <a:latin typeface="Arial" panose="020B0604020202020204" pitchFamily="34" charset="0"/>
+                    <a:cs typeface="Arial" panose="020B0604020202020204" pitchFamily="34" charset="0"/>
+                  </a:endParaRPr>
+                </a:p>
+              </p:txBody>
+            </p:sp>
+          </p:grpSp>
+          <p:grpSp>
+            <p:nvGrpSpPr>
+              <p:cNvPr id="33" name="Group 32"/>
+              <p:cNvGrpSpPr/>
+              <p:nvPr/>
+            </p:nvGrpSpPr>
+            <p:grpSpPr>
+              <a:xfrm>
+                <a:off x="5148065" y="2780928"/>
+                <a:ext cx="1465191" cy="1224136"/>
+                <a:chOff x="3815917" y="2492896"/>
+                <a:chExt cx="1465191" cy="1224136"/>
+              </a:xfrm>
+            </p:grpSpPr>
+            <p:sp>
+              <p:nvSpPr>
+                <p:cNvPr id="48" name="Oval 47"/>
+                <p:cNvSpPr/>
+                <p:nvPr/>
+              </p:nvSpPr>
+              <p:spPr>
+                <a:xfrm>
+                  <a:off x="3923928" y="2492896"/>
+                  <a:ext cx="1224136" cy="1224136"/>
+                </a:xfrm>
+                <a:prstGeom prst="ellipse">
+                  <a:avLst/>
+                </a:prstGeom>
+                <a:solidFill>
+                  <a:srgbClr val="5B9BD5"/>
+                </a:solidFill>
+              </p:spPr>
+              <p:style>
+                <a:lnRef idx="2">
+                  <a:schemeClr val="accent1">
+                    <a:shade val="50000"/>
+                  </a:schemeClr>
+                </a:lnRef>
+                <a:fillRef idx="1">
+                  <a:schemeClr val="accent1"/>
+                </a:fillRef>
+                <a:effectRef idx="0">
+                  <a:schemeClr val="accent1"/>
+                </a:effectRef>
+                <a:fontRef idx="minor">
+                  <a:schemeClr val="lt1"/>
+                </a:fontRef>
+              </p:style>
+              <p:txBody>
+                <a:bodyPr rtlCol="0" anchor="ctr"/>
+                <a:lstStyle/>
+                <a:p>
+                  <a:pPr algn="ctr"/>
+                  <a:endParaRPr lang="en-GB" sz="1000" dirty="0">
+                    <a:latin typeface="Arial" panose="020B0604020202020204" pitchFamily="34" charset="0"/>
+                    <a:cs typeface="Arial" panose="020B0604020202020204" pitchFamily="34" charset="0"/>
+                  </a:endParaRPr>
+                </a:p>
+              </p:txBody>
+            </p:sp>
+            <p:sp>
+              <p:nvSpPr>
+                <p:cNvPr id="49" name="TextBox 48"/>
+                <p:cNvSpPr txBox="1"/>
+                <p:nvPr/>
+              </p:nvSpPr>
+              <p:spPr>
+                <a:xfrm>
+                  <a:off x="3815917" y="2843354"/>
+                  <a:ext cx="1465191" cy="551892"/>
+                </a:xfrm>
+                <a:prstGeom prst="rect">
+                  <a:avLst/>
+                </a:prstGeom>
+                <a:noFill/>
+              </p:spPr>
+              <p:txBody>
+                <a:bodyPr wrap="square" rtlCol="0">
+                  <a:spAutoFit/>
+                </a:bodyPr>
+                <a:lstStyle/>
+                <a:p>
+                  <a:pPr algn="ctr"/>
+                  <a:r>
+                    <a:rPr lang="pl-PL" sz="1100" dirty="0">
+                      <a:solidFill>
+                        <a:schemeClr val="bg1"/>
+                      </a:solidFill>
+                      <a:latin typeface="Arial" panose="020B0604020202020204" pitchFamily="34" charset="0"/>
+                      <a:cs typeface="Arial" panose="020B0604020202020204" pitchFamily="34" charset="0"/>
+                    </a:rPr>
+                    <a:t>PROCESSING</a:t>
+                  </a:r>
+                  <a:r>
+                    <a:rPr lang="pl-PL" sz="1200" dirty="0">
+                      <a:solidFill>
+                        <a:schemeClr val="bg1"/>
+                      </a:solidFill>
+                      <a:latin typeface="Arial" panose="020B0604020202020204" pitchFamily="34" charset="0"/>
+                      <a:cs typeface="Arial" panose="020B0604020202020204" pitchFamily="34" charset="0"/>
+                    </a:rPr>
+                    <a:t> DATA</a:t>
+                  </a:r>
+                  <a:endParaRPr lang="en-GB" sz="1200" dirty="0">
+                    <a:solidFill>
+                      <a:schemeClr val="bg1"/>
+                    </a:solidFill>
+                    <a:latin typeface="Arial" panose="020B0604020202020204" pitchFamily="34" charset="0"/>
+                    <a:cs typeface="Arial" panose="020B0604020202020204" pitchFamily="34" charset="0"/>
+                  </a:endParaRPr>
+                </a:p>
+              </p:txBody>
+            </p:sp>
+          </p:grpSp>
+          <p:grpSp>
+            <p:nvGrpSpPr>
+              <p:cNvPr id="34" name="Group 33"/>
+              <p:cNvGrpSpPr/>
+              <p:nvPr/>
+            </p:nvGrpSpPr>
+            <p:grpSpPr>
+              <a:xfrm>
+                <a:off x="5148065" y="4509120"/>
+                <a:ext cx="1400261" cy="1224136"/>
+                <a:chOff x="3851921" y="2492896"/>
+                <a:chExt cx="1400261" cy="1224136"/>
+              </a:xfrm>
+            </p:grpSpPr>
+            <p:sp>
+              <p:nvSpPr>
+                <p:cNvPr id="46" name="Oval 45"/>
+                <p:cNvSpPr/>
+                <p:nvPr/>
+              </p:nvSpPr>
+              <p:spPr>
+                <a:xfrm>
+                  <a:off x="3923928" y="2492896"/>
+                  <a:ext cx="1224136" cy="1224136"/>
+                </a:xfrm>
+                <a:prstGeom prst="ellipse">
+                  <a:avLst/>
+                </a:prstGeom>
+                <a:solidFill>
+                  <a:srgbClr val="5B9BD5"/>
+                </a:solidFill>
+              </p:spPr>
+              <p:style>
+                <a:lnRef idx="2">
+                  <a:schemeClr val="accent1">
+                    <a:shade val="50000"/>
+                  </a:schemeClr>
+                </a:lnRef>
+                <a:fillRef idx="1">
+                  <a:schemeClr val="accent1"/>
+                </a:fillRef>
+                <a:effectRef idx="0">
+                  <a:schemeClr val="accent1"/>
+                </a:effectRef>
+                <a:fontRef idx="minor">
+                  <a:schemeClr val="lt1"/>
+                </a:fontRef>
+              </p:style>
+              <p:txBody>
+                <a:bodyPr rtlCol="0" anchor="ctr"/>
+                <a:lstStyle/>
+                <a:p>
+                  <a:pPr algn="ctr"/>
+                  <a:endParaRPr lang="en-GB" sz="1000" dirty="0">
+                    <a:latin typeface="Arial" panose="020B0604020202020204" pitchFamily="34" charset="0"/>
+                    <a:cs typeface="Arial" panose="020B0604020202020204" pitchFamily="34" charset="0"/>
+                  </a:endParaRPr>
+                </a:p>
+              </p:txBody>
+            </p:sp>
+            <p:sp>
+              <p:nvSpPr>
+                <p:cNvPr id="47" name="TextBox 46"/>
+                <p:cNvSpPr txBox="1"/>
+                <p:nvPr/>
+              </p:nvSpPr>
+              <p:spPr>
+                <a:xfrm>
+                  <a:off x="3851921" y="2843354"/>
+                  <a:ext cx="1400261" cy="588685"/>
+                </a:xfrm>
+                <a:prstGeom prst="rect">
+                  <a:avLst/>
+                </a:prstGeom>
+                <a:noFill/>
+              </p:spPr>
+              <p:txBody>
+                <a:bodyPr wrap="square" rtlCol="0">
+                  <a:spAutoFit/>
+                </a:bodyPr>
+                <a:lstStyle/>
+                <a:p>
+                  <a:pPr algn="ctr"/>
+                  <a:r>
+                    <a:rPr lang="pl-PL" sz="1200" dirty="0">
+                      <a:solidFill>
+                        <a:schemeClr val="bg1"/>
+                      </a:solidFill>
+                      <a:latin typeface="Arial" panose="020B0604020202020204" pitchFamily="34" charset="0"/>
+                      <a:cs typeface="Arial" panose="020B0604020202020204" pitchFamily="34" charset="0"/>
+                    </a:rPr>
+                    <a:t>ANALYSING</a:t>
+                  </a:r>
+                  <a:r>
+                    <a:rPr lang="pl-PL" sz="1400" dirty="0">
+                      <a:solidFill>
+                        <a:schemeClr val="bg1"/>
+                      </a:solidFill>
+                      <a:latin typeface="Arial" panose="020B0604020202020204" pitchFamily="34" charset="0"/>
+                      <a:cs typeface="Arial" panose="020B0604020202020204" pitchFamily="34" charset="0"/>
+                    </a:rPr>
+                    <a:t> </a:t>
+                  </a:r>
+                  <a:r>
+                    <a:rPr lang="pl-PL" sz="1200" dirty="0">
+                      <a:solidFill>
+                        <a:schemeClr val="bg1"/>
+                      </a:solidFill>
+                      <a:latin typeface="Arial" panose="020B0604020202020204" pitchFamily="34" charset="0"/>
+                      <a:cs typeface="Arial" panose="020B0604020202020204" pitchFamily="34" charset="0"/>
+                    </a:rPr>
+                    <a:t>DATA</a:t>
+                  </a:r>
+                  <a:endParaRPr lang="en-GB" sz="1200" dirty="0">
+                    <a:solidFill>
+                      <a:schemeClr val="bg1"/>
+                    </a:solidFill>
+                    <a:latin typeface="Arial" panose="020B0604020202020204" pitchFamily="34" charset="0"/>
+                    <a:cs typeface="Arial" panose="020B0604020202020204" pitchFamily="34" charset="0"/>
+                  </a:endParaRPr>
+                </a:p>
+              </p:txBody>
+            </p:sp>
+          </p:grpSp>
+          <p:grpSp>
+            <p:nvGrpSpPr>
+              <p:cNvPr id="37" name="Group 36"/>
+              <p:cNvGrpSpPr/>
+              <p:nvPr/>
+            </p:nvGrpSpPr>
+            <p:grpSpPr>
+              <a:xfrm>
+                <a:off x="3498957" y="5373216"/>
+                <a:ext cx="1509656" cy="1224136"/>
+                <a:chOff x="3786989" y="2492896"/>
+                <a:chExt cx="1509656" cy="1224136"/>
+              </a:xfrm>
+            </p:grpSpPr>
+            <p:sp>
+              <p:nvSpPr>
+                <p:cNvPr id="44" name="Oval 43"/>
+                <p:cNvSpPr/>
+                <p:nvPr/>
+              </p:nvSpPr>
+              <p:spPr>
+                <a:xfrm>
+                  <a:off x="3923928" y="2492896"/>
+                  <a:ext cx="1224136" cy="1224136"/>
+                </a:xfrm>
+                <a:prstGeom prst="ellipse">
+                  <a:avLst/>
+                </a:prstGeom>
+              </p:spPr>
+              <p:style>
+                <a:lnRef idx="2">
+                  <a:schemeClr val="accent1">
+                    <a:shade val="50000"/>
+                  </a:schemeClr>
+                </a:lnRef>
+                <a:fillRef idx="1">
+                  <a:schemeClr val="accent1"/>
+                </a:fillRef>
+                <a:effectRef idx="0">
+                  <a:schemeClr val="accent1"/>
+                </a:effectRef>
+                <a:fontRef idx="minor">
+                  <a:schemeClr val="lt1"/>
+                </a:fontRef>
+              </p:style>
+              <p:txBody>
+                <a:bodyPr rtlCol="0" anchor="ctr"/>
+                <a:lstStyle/>
+                <a:p>
+                  <a:pPr algn="ctr"/>
+                  <a:endParaRPr lang="en-GB" sz="1000" dirty="0">
+                    <a:latin typeface="Arial" panose="020B0604020202020204" pitchFamily="34" charset="0"/>
+                    <a:cs typeface="Arial" panose="020B0604020202020204" pitchFamily="34" charset="0"/>
+                  </a:endParaRPr>
+                </a:p>
+              </p:txBody>
+            </p:sp>
+            <p:sp>
+              <p:nvSpPr>
+                <p:cNvPr id="45" name="TextBox 44"/>
+                <p:cNvSpPr txBox="1"/>
+                <p:nvPr/>
+              </p:nvSpPr>
+              <p:spPr>
+                <a:xfrm>
+                  <a:off x="3786989" y="2843354"/>
+                  <a:ext cx="1509656" cy="551892"/>
+                </a:xfrm>
+                <a:prstGeom prst="rect">
+                  <a:avLst/>
+                </a:prstGeom>
+                <a:noFill/>
+              </p:spPr>
+              <p:txBody>
+                <a:bodyPr wrap="square" rtlCol="0">
+                  <a:spAutoFit/>
+                </a:bodyPr>
+                <a:lstStyle/>
+                <a:p>
+                  <a:pPr algn="ctr"/>
+                  <a:r>
+                    <a:rPr lang="pl-PL" sz="1100" dirty="0">
+                      <a:solidFill>
+                        <a:schemeClr val="bg1"/>
+                      </a:solidFill>
+                      <a:latin typeface="Arial" panose="020B0604020202020204" pitchFamily="34" charset="0"/>
+                      <a:cs typeface="Arial" panose="020B0604020202020204" pitchFamily="34" charset="0"/>
+                    </a:rPr>
+                    <a:t>PRESERVING</a:t>
+                  </a:r>
+                  <a:r>
+                    <a:rPr lang="pl-PL" sz="1200" dirty="0">
+                      <a:solidFill>
+                        <a:schemeClr val="bg1"/>
+                      </a:solidFill>
+                      <a:latin typeface="Arial" panose="020B0604020202020204" pitchFamily="34" charset="0"/>
+                      <a:cs typeface="Arial" panose="020B0604020202020204" pitchFamily="34" charset="0"/>
+                    </a:rPr>
+                    <a:t> DATA</a:t>
+                  </a:r>
+                  <a:endParaRPr lang="en-GB" sz="1200" dirty="0">
+                    <a:solidFill>
+                      <a:schemeClr val="bg1"/>
+                    </a:solidFill>
+                    <a:latin typeface="Arial" panose="020B0604020202020204" pitchFamily="34" charset="0"/>
+                    <a:cs typeface="Arial" panose="020B0604020202020204" pitchFamily="34" charset="0"/>
+                  </a:endParaRPr>
+                </a:p>
+              </p:txBody>
+            </p:sp>
+          </p:grpSp>
+          <p:grpSp>
+            <p:nvGrpSpPr>
+              <p:cNvPr id="38" name="Group 37"/>
+              <p:cNvGrpSpPr/>
+              <p:nvPr/>
+            </p:nvGrpSpPr>
+            <p:grpSpPr>
+              <a:xfrm>
+                <a:off x="1979712" y="4509120"/>
+                <a:ext cx="1224136" cy="1224136"/>
+                <a:chOff x="3923928" y="2564904"/>
+                <a:chExt cx="1224136" cy="1224136"/>
+              </a:xfrm>
+            </p:grpSpPr>
+            <p:sp>
+              <p:nvSpPr>
+                <p:cNvPr id="42" name="Oval 41"/>
+                <p:cNvSpPr/>
+                <p:nvPr/>
+              </p:nvSpPr>
+              <p:spPr>
+                <a:xfrm>
+                  <a:off x="3923928" y="2564904"/>
+                  <a:ext cx="1224136" cy="1224136"/>
+                </a:xfrm>
+                <a:prstGeom prst="ellipse">
+                  <a:avLst/>
+                </a:prstGeom>
+                <a:solidFill>
+                  <a:srgbClr val="5B9BD5"/>
+                </a:solidFill>
+              </p:spPr>
+              <p:style>
+                <a:lnRef idx="2">
+                  <a:schemeClr val="accent1">
+                    <a:shade val="50000"/>
+                  </a:schemeClr>
+                </a:lnRef>
+                <a:fillRef idx="1">
+                  <a:schemeClr val="accent1"/>
+                </a:fillRef>
+                <a:effectRef idx="0">
+                  <a:schemeClr val="accent1"/>
+                </a:effectRef>
+                <a:fontRef idx="minor">
+                  <a:schemeClr val="lt1"/>
+                </a:fontRef>
+              </p:style>
+              <p:txBody>
+                <a:bodyPr rtlCol="0" anchor="ctr"/>
+                <a:lstStyle/>
+                <a:p>
+                  <a:pPr algn="ctr"/>
+                  <a:endParaRPr lang="en-GB" sz="1000" dirty="0">
+                    <a:latin typeface="Arial" panose="020B0604020202020204" pitchFamily="34" charset="0"/>
+                    <a:cs typeface="Arial" panose="020B0604020202020204" pitchFamily="34" charset="0"/>
+                  </a:endParaRPr>
+                </a:p>
+              </p:txBody>
+            </p:sp>
+            <p:sp>
+              <p:nvSpPr>
+                <p:cNvPr id="43" name="TextBox 42"/>
+                <p:cNvSpPr txBox="1"/>
+                <p:nvPr/>
+              </p:nvSpPr>
+              <p:spPr>
+                <a:xfrm>
+                  <a:off x="3959932" y="2941834"/>
+                  <a:ext cx="1152128" cy="551892"/>
+                </a:xfrm>
+                <a:prstGeom prst="rect">
+                  <a:avLst/>
+                </a:prstGeom>
+                <a:noFill/>
+              </p:spPr>
+              <p:txBody>
+                <a:bodyPr wrap="square" rtlCol="0">
+                  <a:spAutoFit/>
+                </a:bodyPr>
+                <a:lstStyle/>
+                <a:p>
+                  <a:pPr algn="ctr"/>
+                  <a:r>
+                    <a:rPr lang="pl-PL" sz="1200" dirty="0" smtClean="0">
+                      <a:solidFill>
+                        <a:schemeClr val="bg1"/>
+                      </a:solidFill>
+                      <a:latin typeface="Arial" panose="020B0604020202020204" pitchFamily="34" charset="0"/>
+                      <a:cs typeface="Arial" panose="020B0604020202020204" pitchFamily="34" charset="0"/>
+                    </a:rPr>
+                    <a:t>SHARING</a:t>
+                  </a:r>
+                  <a:endParaRPr lang="pl-PL" sz="1200" dirty="0">
+                    <a:solidFill>
+                      <a:schemeClr val="bg1"/>
+                    </a:solidFill>
+                    <a:latin typeface="Arial" panose="020B0604020202020204" pitchFamily="34" charset="0"/>
+                    <a:cs typeface="Arial" panose="020B0604020202020204" pitchFamily="34" charset="0"/>
+                  </a:endParaRPr>
+                </a:p>
+                <a:p>
+                  <a:pPr algn="ctr"/>
+                  <a:r>
+                    <a:rPr lang="pl-PL" sz="1200" dirty="0" smtClean="0">
+                      <a:solidFill>
+                        <a:schemeClr val="bg1"/>
+                      </a:solidFill>
+                      <a:latin typeface="Arial" panose="020B0604020202020204" pitchFamily="34" charset="0"/>
+                      <a:cs typeface="Arial" panose="020B0604020202020204" pitchFamily="34" charset="0"/>
+                    </a:rPr>
+                    <a:t>DATA</a:t>
+                  </a:r>
+                  <a:endParaRPr lang="en-GB" sz="1200" dirty="0">
+                    <a:solidFill>
+                      <a:schemeClr val="bg1"/>
+                    </a:solidFill>
+                    <a:latin typeface="Arial" panose="020B0604020202020204" pitchFamily="34" charset="0"/>
+                    <a:cs typeface="Arial" panose="020B0604020202020204" pitchFamily="34" charset="0"/>
+                  </a:endParaRPr>
+                </a:p>
+              </p:txBody>
+            </p:sp>
+          </p:grpSp>
+          <p:grpSp>
+            <p:nvGrpSpPr>
+              <p:cNvPr id="39" name="Group 38"/>
+              <p:cNvGrpSpPr/>
+              <p:nvPr/>
+            </p:nvGrpSpPr>
+            <p:grpSpPr>
+              <a:xfrm>
+                <a:off x="1979712" y="2708920"/>
+                <a:ext cx="1224136" cy="1224136"/>
+                <a:chOff x="3923928" y="2420888"/>
+                <a:chExt cx="1224136" cy="1224136"/>
+              </a:xfrm>
+            </p:grpSpPr>
+            <p:sp>
+              <p:nvSpPr>
+                <p:cNvPr id="40" name="Oval 39"/>
+                <p:cNvSpPr/>
+                <p:nvPr/>
+              </p:nvSpPr>
+              <p:spPr>
+                <a:xfrm>
+                  <a:off x="3923928" y="2420888"/>
+                  <a:ext cx="1224136" cy="1224136"/>
+                </a:xfrm>
+                <a:prstGeom prst="ellipse">
+                  <a:avLst/>
+                </a:prstGeom>
+                <a:solidFill>
+                  <a:srgbClr val="00B050"/>
+                </a:solidFill>
+              </p:spPr>
+              <p:style>
+                <a:lnRef idx="2">
+                  <a:schemeClr val="accent1">
+                    <a:shade val="50000"/>
+                  </a:schemeClr>
+                </a:lnRef>
+                <a:fillRef idx="1">
+                  <a:schemeClr val="accent1"/>
+                </a:fillRef>
+                <a:effectRef idx="0">
+                  <a:schemeClr val="accent1"/>
+                </a:effectRef>
+                <a:fontRef idx="minor">
+                  <a:schemeClr val="lt1"/>
+                </a:fontRef>
+              </p:style>
+              <p:txBody>
+                <a:bodyPr rtlCol="0" anchor="ctr"/>
+                <a:lstStyle/>
+                <a:p>
+                  <a:pPr algn="ctr"/>
+                  <a:endParaRPr lang="en-GB" sz="1000" dirty="0">
+                    <a:latin typeface="Arial" panose="020B0604020202020204" pitchFamily="34" charset="0"/>
+                    <a:cs typeface="Arial" panose="020B0604020202020204" pitchFamily="34" charset="0"/>
+                  </a:endParaRPr>
+                </a:p>
+              </p:txBody>
+            </p:sp>
+            <p:sp>
+              <p:nvSpPr>
+                <p:cNvPr id="41" name="TextBox 40"/>
+                <p:cNvSpPr txBox="1"/>
+                <p:nvPr/>
+              </p:nvSpPr>
+              <p:spPr>
+                <a:xfrm>
+                  <a:off x="3959932" y="2813809"/>
+                  <a:ext cx="1152128" cy="551892"/>
+                </a:xfrm>
+                <a:prstGeom prst="rect">
+                  <a:avLst/>
+                </a:prstGeom>
+                <a:noFill/>
+              </p:spPr>
+              <p:txBody>
+                <a:bodyPr wrap="square" rtlCol="0">
+                  <a:spAutoFit/>
+                </a:bodyPr>
+                <a:lstStyle/>
+                <a:p>
+                  <a:pPr algn="ctr"/>
+                  <a:r>
+                    <a:rPr lang="pl-PL" sz="1200" dirty="0">
+                      <a:solidFill>
+                        <a:schemeClr val="bg1"/>
+                      </a:solidFill>
+                      <a:latin typeface="Arial" panose="020B0604020202020204" pitchFamily="34" charset="0"/>
+                      <a:cs typeface="Arial" panose="020B0604020202020204" pitchFamily="34" charset="0"/>
+                    </a:rPr>
+                    <a:t>RE-USING DATA</a:t>
+                  </a:r>
+                  <a:endParaRPr lang="en-GB" sz="1200" dirty="0">
+                    <a:solidFill>
+                      <a:schemeClr val="bg1"/>
+                    </a:solidFill>
+                    <a:latin typeface="Arial" panose="020B0604020202020204" pitchFamily="34" charset="0"/>
+                    <a:cs typeface="Arial" panose="020B0604020202020204" pitchFamily="34" charset="0"/>
+                  </a:endParaRPr>
+                </a:p>
+              </p:txBody>
+            </p:sp>
+          </p:grpSp>
+        </p:grpSp>
+        <p:sp>
+          <p:nvSpPr>
+            <p:cNvPr id="25" name="Right Arrow 24"/>
+            <p:cNvSpPr/>
+            <p:nvPr/>
+          </p:nvSpPr>
+          <p:spPr>
+            <a:xfrm rot="1619807" flipV="1">
+              <a:off x="5174188" y="2303398"/>
+              <a:ext cx="253828" cy="151064"/>
+            </a:xfrm>
+            <a:prstGeom prst="rightArrow">
+              <a:avLst>
+                <a:gd name="adj1" fmla="val 27886"/>
+                <a:gd name="adj2" fmla="val 50000"/>
+              </a:avLst>
+            </a:prstGeom>
+            <a:solidFill>
+              <a:srgbClr val="91C6F7"/>
+            </a:solidFill>
+            <a:ln>
+              <a:solidFill>
+                <a:srgbClr val="91C6F7"/>
+              </a:solidFill>
+            </a:ln>
+          </p:spPr>
+          <p:style>
+            <a:lnRef idx="2">
+              <a:schemeClr val="accent1">
+                <a:shade val="50000"/>
+              </a:schemeClr>
+            </a:lnRef>
+            <a:fillRef idx="1">
+              <a:schemeClr val="accent1"/>
+            </a:fillRef>
+            <a:effectRef idx="0">
+              <a:schemeClr val="accent1"/>
+            </a:effectRef>
+            <a:fontRef idx="minor">
+              <a:schemeClr val="lt1"/>
+            </a:fontRef>
+          </p:style>
+          <p:txBody>
+            <a:bodyPr rtlCol="0" anchor="ctr"/>
+            <a:lstStyle/>
+            <a:p>
+              <a:pPr algn="ctr"/>
+              <a:endParaRPr lang="en-GB" dirty="0"/>
+            </a:p>
+          </p:txBody>
+        </p:sp>
+        <p:sp>
+          <p:nvSpPr>
+            <p:cNvPr id="26" name="Right Arrow 25"/>
+            <p:cNvSpPr/>
+            <p:nvPr/>
+          </p:nvSpPr>
+          <p:spPr>
+            <a:xfrm rot="5212365" flipV="1">
+              <a:off x="6197255" y="3995999"/>
+              <a:ext cx="253828" cy="151064"/>
+            </a:xfrm>
+            <a:prstGeom prst="rightArrow">
+              <a:avLst>
+                <a:gd name="adj1" fmla="val 27886"/>
+                <a:gd name="adj2" fmla="val 50000"/>
+              </a:avLst>
+            </a:prstGeom>
+            <a:solidFill>
+              <a:srgbClr val="91C6F7"/>
+            </a:solidFill>
+            <a:ln>
+              <a:solidFill>
+                <a:srgbClr val="91C6F7"/>
+              </a:solidFill>
+            </a:ln>
+          </p:spPr>
+          <p:style>
+            <a:lnRef idx="2">
+              <a:schemeClr val="accent1">
+                <a:shade val="50000"/>
+              </a:schemeClr>
+            </a:lnRef>
+            <a:fillRef idx="1">
+              <a:schemeClr val="accent1"/>
+            </a:fillRef>
+            <a:effectRef idx="0">
+              <a:schemeClr val="accent1"/>
+            </a:effectRef>
+            <a:fontRef idx="minor">
+              <a:schemeClr val="lt1"/>
+            </a:fontRef>
+          </p:style>
+          <p:txBody>
+            <a:bodyPr rtlCol="0" anchor="ctr"/>
+            <a:lstStyle/>
+            <a:p>
+              <a:pPr algn="ctr"/>
+              <a:endParaRPr lang="en-GB" dirty="0"/>
+            </a:p>
+          </p:txBody>
+        </p:sp>
+        <p:sp>
+          <p:nvSpPr>
+            <p:cNvPr id="27" name="Right Arrow 26"/>
+            <p:cNvSpPr/>
+            <p:nvPr/>
+          </p:nvSpPr>
+          <p:spPr>
+            <a:xfrm rot="8847248" flipV="1">
+              <a:off x="5300817" y="5674556"/>
+              <a:ext cx="253828" cy="151064"/>
+            </a:xfrm>
+            <a:prstGeom prst="rightArrow">
+              <a:avLst>
+                <a:gd name="adj1" fmla="val 27886"/>
+                <a:gd name="adj2" fmla="val 50000"/>
+              </a:avLst>
+            </a:prstGeom>
+            <a:solidFill>
+              <a:srgbClr val="91C6F7"/>
+            </a:solidFill>
+            <a:ln>
+              <a:solidFill>
+                <a:srgbClr val="91C6F7"/>
+              </a:solidFill>
+            </a:ln>
+          </p:spPr>
+          <p:style>
+            <a:lnRef idx="2">
+              <a:schemeClr val="accent1">
+                <a:shade val="50000"/>
+              </a:schemeClr>
+            </a:lnRef>
+            <a:fillRef idx="1">
+              <a:schemeClr val="accent1"/>
+            </a:fillRef>
+            <a:effectRef idx="0">
+              <a:schemeClr val="accent1"/>
+            </a:effectRef>
+            <a:fontRef idx="minor">
+              <a:schemeClr val="lt1"/>
+            </a:fontRef>
+          </p:style>
+          <p:txBody>
+            <a:bodyPr rtlCol="0" anchor="ctr"/>
+            <a:lstStyle/>
+            <a:p>
+              <a:pPr algn="ctr"/>
+              <a:endParaRPr lang="en-GB" dirty="0"/>
+            </a:p>
+          </p:txBody>
+        </p:sp>
+        <p:sp>
+          <p:nvSpPr>
+            <p:cNvPr id="28" name="Right Arrow 27"/>
+            <p:cNvSpPr/>
+            <p:nvPr/>
+          </p:nvSpPr>
+          <p:spPr>
+            <a:xfrm rot="12776736" flipV="1">
+              <a:off x="3097300" y="5646115"/>
+              <a:ext cx="253828" cy="151064"/>
+            </a:xfrm>
+            <a:prstGeom prst="rightArrow">
+              <a:avLst>
+                <a:gd name="adj1" fmla="val 27886"/>
+                <a:gd name="adj2" fmla="val 50000"/>
+              </a:avLst>
+            </a:prstGeom>
+            <a:solidFill>
+              <a:srgbClr val="91C6F7"/>
+            </a:solidFill>
+            <a:ln>
+              <a:solidFill>
+                <a:srgbClr val="91C6F7"/>
+              </a:solidFill>
+            </a:ln>
+          </p:spPr>
+          <p:style>
+            <a:lnRef idx="2">
+              <a:schemeClr val="accent1">
+                <a:shade val="50000"/>
+              </a:schemeClr>
+            </a:lnRef>
+            <a:fillRef idx="1">
+              <a:schemeClr val="accent1"/>
+            </a:fillRef>
+            <a:effectRef idx="0">
+              <a:schemeClr val="accent1"/>
+            </a:effectRef>
+            <a:fontRef idx="minor">
+              <a:schemeClr val="lt1"/>
+            </a:fontRef>
+          </p:style>
+          <p:txBody>
+            <a:bodyPr rtlCol="0" anchor="ctr"/>
+            <a:lstStyle/>
+            <a:p>
+              <a:pPr algn="ctr"/>
+              <a:endParaRPr lang="en-GB" dirty="0"/>
+            </a:p>
+          </p:txBody>
+        </p:sp>
+        <p:sp>
+          <p:nvSpPr>
+            <p:cNvPr id="29" name="Right Arrow 28"/>
+            <p:cNvSpPr/>
+            <p:nvPr/>
+          </p:nvSpPr>
+          <p:spPr>
+            <a:xfrm rot="16200000" flipV="1">
+              <a:off x="2254352" y="3914627"/>
+              <a:ext cx="253828" cy="151064"/>
+            </a:xfrm>
+            <a:prstGeom prst="rightArrow">
+              <a:avLst>
+                <a:gd name="adj1" fmla="val 27886"/>
+                <a:gd name="adj2" fmla="val 50000"/>
+              </a:avLst>
+            </a:prstGeom>
+            <a:solidFill>
+              <a:srgbClr val="91C6F7"/>
+            </a:solidFill>
+            <a:ln>
+              <a:solidFill>
+                <a:srgbClr val="91C6F7"/>
+              </a:solidFill>
+            </a:ln>
+          </p:spPr>
+          <p:style>
+            <a:lnRef idx="2">
+              <a:schemeClr val="accent1">
+                <a:shade val="50000"/>
+              </a:schemeClr>
+            </a:lnRef>
+            <a:fillRef idx="1">
+              <a:schemeClr val="accent1"/>
+            </a:fillRef>
+            <a:effectRef idx="0">
+              <a:schemeClr val="accent1"/>
+            </a:effectRef>
+            <a:fontRef idx="minor">
+              <a:schemeClr val="lt1"/>
+            </a:fontRef>
+          </p:style>
+          <p:txBody>
+            <a:bodyPr rtlCol="0" anchor="ctr"/>
+            <a:lstStyle/>
+            <a:p>
+              <a:pPr algn="ctr"/>
+              <a:endParaRPr lang="en-GB" dirty="0"/>
+            </a:p>
+          </p:txBody>
+        </p:sp>
+        <p:sp>
+          <p:nvSpPr>
+            <p:cNvPr id="30" name="Right Arrow 29"/>
+            <p:cNvSpPr/>
+            <p:nvPr/>
+          </p:nvSpPr>
+          <p:spPr>
+            <a:xfrm rot="19590936" flipV="1">
+              <a:off x="3218543" y="2332540"/>
+              <a:ext cx="253828" cy="151064"/>
+            </a:xfrm>
+            <a:prstGeom prst="rightArrow">
+              <a:avLst>
+                <a:gd name="adj1" fmla="val 27886"/>
+                <a:gd name="adj2" fmla="val 50000"/>
+              </a:avLst>
+            </a:prstGeom>
+            <a:solidFill>
+              <a:srgbClr val="91C6F7"/>
+            </a:solidFill>
+            <a:ln>
+              <a:solidFill>
+                <a:srgbClr val="91C6F7"/>
+              </a:solidFill>
+            </a:ln>
+          </p:spPr>
+          <p:style>
+            <a:lnRef idx="2">
+              <a:schemeClr val="accent1">
+                <a:shade val="50000"/>
+              </a:schemeClr>
+            </a:lnRef>
+            <a:fillRef idx="1">
+              <a:schemeClr val="accent1"/>
+            </a:fillRef>
+            <a:effectRef idx="0">
+              <a:schemeClr val="accent1"/>
+            </a:effectRef>
+            <a:fontRef idx="minor">
+              <a:schemeClr val="lt1"/>
+            </a:fontRef>
+          </p:style>
+          <p:txBody>
+            <a:bodyPr rtlCol="0" anchor="ctr"/>
+            <a:lstStyle/>
+            <a:p>
+              <a:pPr algn="ctr"/>
+              <a:endParaRPr lang="en-GB" dirty="0"/>
+            </a:p>
+          </p:txBody>
+        </p:sp>
+      </p:grpSp>
+    </p:spTree>
+    <p:extLst>
+      <p:ext uri="{BB962C8B-B14F-4D97-AF65-F5344CB8AC3E}">
+        <p14:creationId xmlns:p14="http://schemas.microsoft.com/office/powerpoint/2010/main" val="4206537046"/>
       </p:ext>
     </p:extLst>
   </p:cSld>

</xml_diff>